<commit_message>
Adding updated notes to the repo + adding profit field in Fact Sale for visualization
</commit_message>
<xml_diff>
--- a/Sem04/DAI1/AdventureWorksExamPrep/Presentation.pptx
+++ b/Sem04/DAI1/AdventureWorksExamPrep/Presentation.pptx
@@ -117,6 +117,11 @@
       </a:defRPr>
     </a:lvl9pPr>
   </p:defaultTextStyle>
+  <p:extLst>
+    <p:ext uri="{EFAFB233-063F-42B5-8137-9DF3F51BA10A}">
+      <p15:sldGuideLst xmlns:p15="http://schemas.microsoft.com/office/powerpoint/2012/main"/>
+    </p:ext>
+  </p:extLst>
 </p:presentation>
 </file>
 
@@ -4321,10 +4326,10 @@
       </p:sp>
       <p:pic>
         <p:nvPicPr>
-          <p:cNvPr id="5" name="Content Placeholder 4">
-            <a:extLst>
-              <a:ext uri="{FF2B5EF4-FFF2-40B4-BE49-F238E27FC236}">
-                <a16:creationId xmlns:a16="http://schemas.microsoft.com/office/drawing/2014/main" id="{63D22315-4D6A-1FA7-C766-848CAB076624}"/>
+          <p:cNvPr id="7" name="Content Placeholder 6">
+            <a:extLst>
+              <a:ext uri="{FF2B5EF4-FFF2-40B4-BE49-F238E27FC236}">
+                <a16:creationId xmlns:a16="http://schemas.microsoft.com/office/drawing/2014/main" id="{60033FFE-6384-805F-183D-2B68391D032B}"/>
               </a:ext>
             </a:extLst>
           </p:cNvPr>
@@ -4343,8 +4348,8 @@
         </p:blipFill>
         <p:spPr>
           <a:xfrm>
-            <a:off x="2147563" y="1825625"/>
-            <a:ext cx="7896873" cy="4351338"/>
+            <a:off x="2175518" y="1825625"/>
+            <a:ext cx="7840964" cy="4351338"/>
           </a:xfrm>
         </p:spPr>
       </p:pic>

</xml_diff>